<commit_message>
Multiple Layout Changes & Navbar troubleshooting
</commit_message>
<xml_diff>
--- a/Design/Design Template.pptx
+++ b/Design/Design Template.pptx
@@ -5,11 +5,12 @@
     <p:sldMasterId id="2147483648" r:id="rId1"/>
   </p:sldMasterIdLst>
   <p:notesMasterIdLst>
-    <p:notesMasterId r:id="rId4"/>
+    <p:notesMasterId r:id="rId5"/>
   </p:notesMasterIdLst>
   <p:sldIdLst>
     <p:sldId id="256" r:id="rId2"/>
     <p:sldId id="259" r:id="rId3"/>
+    <p:sldId id="260" r:id="rId4"/>
   </p:sldIdLst>
   <p:sldSz cx="12192000" cy="6858000"/>
   <p:notesSz cx="6858000" cy="9144000"/>
@@ -5354,6 +5355,142 @@
     <p:extLst>
       <p:ext uri="{BB962C8B-B14F-4D97-AF65-F5344CB8AC3E}">
         <p14:creationId xmlns:p14="http://schemas.microsoft.com/office/powerpoint/2010/main" val="257301730"/>
+      </p:ext>
+    </p:extLst>
+  </p:cSld>
+  <p:clrMapOvr>
+    <a:masterClrMapping/>
+  </p:clrMapOvr>
+</p:sld>
+</file>
+
+<file path=ppt/slides/slide3.xml><?xml version="1.0" encoding="utf-8"?>
+<p:sld xmlns:a="http://schemas.openxmlformats.org/drawingml/2006/main" xmlns:r="http://schemas.openxmlformats.org/officeDocument/2006/relationships" xmlns:p="http://schemas.openxmlformats.org/presentationml/2006/main">
+  <p:cSld>
+    <p:spTree>
+      <p:nvGrpSpPr>
+        <p:cNvPr id="1" name=""/>
+        <p:cNvGrpSpPr/>
+        <p:nvPr/>
+      </p:nvGrpSpPr>
+      <p:grpSpPr>
+        <a:xfrm>
+          <a:off x="0" y="0"/>
+          <a:ext cx="0" cy="0"/>
+          <a:chOff x="0" y="0"/>
+          <a:chExt cx="0" cy="0"/>
+        </a:xfrm>
+      </p:grpSpPr>
+      <p:pic>
+        <p:nvPicPr>
+          <p:cNvPr id="5" name="Picture 4">
+            <a:extLst>
+              <a:ext uri="{FF2B5EF4-FFF2-40B4-BE49-F238E27FC236}">
+                <a16:creationId xmlns:a16="http://schemas.microsoft.com/office/drawing/2014/main" id="{18859DF4-5F43-5D42-92F0-5CC65AB4B3BD}"/>
+              </a:ext>
+            </a:extLst>
+          </p:cNvPr>
+          <p:cNvPicPr>
+            <a:picLocks noChangeAspect="1"/>
+          </p:cNvPicPr>
+          <p:nvPr/>
+        </p:nvPicPr>
+        <p:blipFill>
+          <a:blip r:embed="rId2"/>
+          <a:stretch>
+            <a:fillRect/>
+          </a:stretch>
+        </p:blipFill>
+        <p:spPr>
+          <a:xfrm>
+            <a:off x="305654" y="-1143000"/>
+            <a:ext cx="10287000" cy="6858000"/>
+          </a:xfrm>
+          <a:prstGeom prst="rect">
+            <a:avLst/>
+          </a:prstGeom>
+        </p:spPr>
+      </p:pic>
+      <p:pic>
+        <p:nvPicPr>
+          <p:cNvPr id="7" name="Picture 6">
+            <a:extLst>
+              <a:ext uri="{FF2B5EF4-FFF2-40B4-BE49-F238E27FC236}">
+                <a16:creationId xmlns:a16="http://schemas.microsoft.com/office/drawing/2014/main" id="{26B77F74-AE37-A449-829D-0A14800D7526}"/>
+              </a:ext>
+            </a:extLst>
+          </p:cNvPr>
+          <p:cNvPicPr>
+            <a:picLocks noChangeAspect="1"/>
+          </p:cNvPicPr>
+          <p:nvPr/>
+        </p:nvPicPr>
+        <p:blipFill rotWithShape="1">
+          <a:blip r:embed="rId3"/>
+          <a:srcRect l="15625"/>
+          <a:stretch/>
+        </p:blipFill>
+        <p:spPr>
+          <a:xfrm>
+            <a:off x="313591" y="-1143000"/>
+            <a:ext cx="10287000" cy="6858000"/>
+          </a:xfrm>
+          <a:prstGeom prst="rect">
+            <a:avLst/>
+          </a:prstGeom>
+        </p:spPr>
+      </p:pic>
+      <p:pic>
+        <p:nvPicPr>
+          <p:cNvPr id="3074" name="Picture 2" descr="Heroes Custom Dual Layer Hot Cups | HEROES COFFEE">
+            <a:extLst>
+              <a:ext uri="{FF2B5EF4-FFF2-40B4-BE49-F238E27FC236}">
+                <a16:creationId xmlns:a16="http://schemas.microsoft.com/office/drawing/2014/main" id="{5FC9F11A-C427-FF4B-8BB7-DD82D073C223}"/>
+              </a:ext>
+            </a:extLst>
+          </p:cNvPr>
+          <p:cNvPicPr>
+            <a:picLocks noChangeAspect="1" noChangeArrowheads="1"/>
+          </p:cNvPicPr>
+          <p:nvPr/>
+        </p:nvPicPr>
+        <p:blipFill>
+          <a:blip r:embed="rId4">
+            <a:extLst>
+              <a:ext uri="{28A0092B-C50C-407E-A947-70E740481C1C}">
+                <a14:useLocalDpi xmlns:a14="http://schemas.microsoft.com/office/drawing/2010/main" val="0"/>
+              </a:ext>
+            </a:extLst>
+          </a:blip>
+          <a:srcRect/>
+          <a:stretch>
+            <a:fillRect/>
+          </a:stretch>
+        </p:blipFill>
+        <p:spPr bwMode="auto">
+          <a:xfrm>
+            <a:off x="313591" y="-1143000"/>
+            <a:ext cx="10279063" cy="6858000"/>
+          </a:xfrm>
+          <a:prstGeom prst="rect">
+            <a:avLst/>
+          </a:prstGeom>
+          <a:noFill/>
+          <a:extLst>
+            <a:ext uri="{909E8E84-426E-40DD-AFC4-6F175D3DCCD1}">
+              <a14:hiddenFill xmlns:a14="http://schemas.microsoft.com/office/drawing/2010/main">
+                <a:solidFill>
+                  <a:srgbClr val="FFFFFF"/>
+                </a:solidFill>
+              </a14:hiddenFill>
+            </a:ext>
+          </a:extLst>
+        </p:spPr>
+      </p:pic>
+    </p:spTree>
+    <p:extLst>
+      <p:ext uri="{BB962C8B-B14F-4D97-AF65-F5344CB8AC3E}">
+        <p14:creationId xmlns:p14="http://schemas.microsoft.com/office/powerpoint/2010/main" val="3330495361"/>
       </p:ext>
     </p:extLst>
   </p:cSld>

</xml_diff>